<commit_message>
odkaz na swagger editor
</commit_message>
<xml_diff>
--- a/08-REST/cviceni-08.pptx
+++ b/08-REST/cviceni-08.pptx
@@ -852,7 +852,7 @@
             <a:fld id="{5586B75A-687E-405C-8A0B-8D00578BA2C3}" type="datetimeFigureOut">
               <a:rPr lang="en-US" smtClean="0"/>
               <a:pPr/>
-              <a:t>11/10/2021</a:t>
+              <a:t>11/13/2022</a:t>
             </a:fld>
             <a:endParaRPr lang="en-US" dirty="0"/>
           </a:p>
@@ -1105,7 +1105,7 @@
             <a:fld id="{5586B75A-687E-405C-8A0B-8D00578BA2C3}" type="datetimeFigureOut">
               <a:rPr lang="en-US" smtClean="0"/>
               <a:pPr/>
-              <a:t>11/10/2021</a:t>
+              <a:t>11/13/2022</a:t>
             </a:fld>
             <a:endParaRPr lang="en-US" dirty="0"/>
           </a:p>
@@ -1422,7 +1422,7 @@
             <a:fld id="{5586B75A-687E-405C-8A0B-8D00578BA2C3}" type="datetimeFigureOut">
               <a:rPr lang="en-US" smtClean="0"/>
               <a:pPr/>
-              <a:t>11/10/2021</a:t>
+              <a:t>11/13/2022</a:t>
             </a:fld>
             <a:endParaRPr lang="en-US" dirty="0"/>
           </a:p>
@@ -1752,7 +1752,7 @@
             <a:fld id="{5586B75A-687E-405C-8A0B-8D00578BA2C3}" type="datetimeFigureOut">
               <a:rPr lang="en-US" smtClean="0"/>
               <a:pPr/>
-              <a:t>11/10/2021</a:t>
+              <a:t>11/13/2022</a:t>
             </a:fld>
             <a:endParaRPr lang="en-US" dirty="0"/>
           </a:p>
@@ -2069,7 +2069,7 @@
             <a:fld id="{5586B75A-687E-405C-8A0B-8D00578BA2C3}" type="datetimeFigureOut">
               <a:rPr lang="en-US" smtClean="0"/>
               <a:pPr/>
-              <a:t>11/10/2021</a:t>
+              <a:t>11/13/2022</a:t>
             </a:fld>
             <a:endParaRPr lang="en-US" dirty="0"/>
           </a:p>
@@ -2459,7 +2459,7 @@
             <a:fld id="{5586B75A-687E-405C-8A0B-8D00578BA2C3}" type="datetimeFigureOut">
               <a:rPr lang="en-US" smtClean="0"/>
               <a:pPr/>
-              <a:t>11/10/2021</a:t>
+              <a:t>11/13/2022</a:t>
             </a:fld>
             <a:endParaRPr lang="en-US" dirty="0"/>
           </a:p>
@@ -2631,7 +2631,7 @@
           <a:p>
             <a:fld id="{5F4E5243-F52A-4D37-9694-EB26C6C31910}" type="datetimeFigureOut">
               <a:rPr lang="en-US" smtClean="0"/>
-              <a:t>11/10/2021</a:t>
+              <a:t>11/13/2022</a:t>
             </a:fld>
             <a:endParaRPr lang="en-US" dirty="0"/>
           </a:p>
@@ -2811,7 +2811,7 @@
           <a:p>
             <a:fld id="{3A77B6E1-634A-48DC-9E8B-D894023267EF}" type="datetimeFigureOut">
               <a:rPr lang="en-US" smtClean="0"/>
-              <a:t>11/10/2021</a:t>
+              <a:t>11/13/2022</a:t>
             </a:fld>
             <a:endParaRPr lang="en-US" dirty="0"/>
           </a:p>
@@ -2987,7 +2987,7 @@
           <a:p>
             <a:fld id="{7B2D3E9E-A95C-48F2-B4BF-A71542E0BE9A}" type="datetimeFigureOut">
               <a:rPr lang="en-US" smtClean="0"/>
-              <a:t>11/10/2021</a:t>
+              <a:t>11/13/2022</a:t>
             </a:fld>
             <a:endParaRPr lang="en-US" dirty="0"/>
           </a:p>
@@ -3235,7 +3235,7 @@
             <a:fld id="{5586B75A-687E-405C-8A0B-8D00578BA2C3}" type="datetimeFigureOut">
               <a:rPr lang="en-US" smtClean="0"/>
               <a:pPr/>
-              <a:t>11/10/2021</a:t>
+              <a:t>11/13/2022</a:t>
             </a:fld>
             <a:endParaRPr lang="en-US" dirty="0"/>
           </a:p>
@@ -3468,7 +3468,7 @@
           <a:p>
             <a:fld id="{F12952B5-7A2F-4CC8-B7CE-9234E21C2837}" type="datetimeFigureOut">
               <a:rPr lang="en-US" smtClean="0"/>
-              <a:t>11/10/2021</a:t>
+              <a:t>11/13/2022</a:t>
             </a:fld>
             <a:endParaRPr lang="en-US" dirty="0"/>
           </a:p>
@@ -3842,7 +3842,7 @@
           <a:p>
             <a:fld id="{CE1DA07A-9201-4B4B-BAF2-015AFA30F520}" type="datetimeFigureOut">
               <a:rPr lang="en-US" smtClean="0"/>
-              <a:t>11/10/2021</a:t>
+              <a:t>11/13/2022</a:t>
             </a:fld>
             <a:endParaRPr lang="en-US" dirty="0"/>
           </a:p>
@@ -3965,7 +3965,7 @@
           <a:p>
             <a:fld id="{73D7E00A-486F-4252-8B1D-E32645521F49}" type="datetimeFigureOut">
               <a:rPr lang="en-US" smtClean="0"/>
-              <a:t>11/10/2021</a:t>
+              <a:t>11/13/2022</a:t>
             </a:fld>
             <a:endParaRPr lang="en-US" dirty="0"/>
           </a:p>
@@ -4060,7 +4060,7 @@
           <a:p>
             <a:fld id="{8DDF5F92-E675-4B36-9A60-69A962A68675}" type="datetimeFigureOut">
               <a:rPr lang="en-US" smtClean="0"/>
-              <a:t>11/10/2021</a:t>
+              <a:t>11/13/2022</a:t>
             </a:fld>
             <a:endParaRPr lang="en-US" dirty="0"/>
           </a:p>
@@ -4315,7 +4315,7 @@
           <a:p>
             <a:fld id="{AF6E2C9B-5FA2-460D-9BE7-B0812FC2A6FF}" type="datetimeFigureOut">
               <a:rPr lang="en-US" smtClean="0"/>
-              <a:t>11/10/2021</a:t>
+              <a:t>11/13/2022</a:t>
             </a:fld>
             <a:endParaRPr lang="en-US" dirty="0"/>
           </a:p>
@@ -4580,7 +4580,7 @@
             <a:fld id="{5586B75A-687E-405C-8A0B-8D00578BA2C3}" type="datetimeFigureOut">
               <a:rPr lang="en-US" smtClean="0"/>
               <a:pPr/>
-              <a:t>11/10/2021</a:t>
+              <a:t>11/13/2022</a:t>
             </a:fld>
             <a:endParaRPr lang="en-US" dirty="0"/>
           </a:p>
@@ -5327,7 +5327,7 @@
             <a:fld id="{5586B75A-687E-405C-8A0B-8D00578BA2C3}" type="datetimeFigureOut">
               <a:rPr lang="en-US" smtClean="0"/>
               <a:pPr/>
-              <a:t>11/10/2021</a:t>
+              <a:t>11/13/2022</a:t>
             </a:fld>
             <a:endParaRPr lang="en-US" dirty="0"/>
           </a:p>
@@ -6702,17 +6702,16 @@
                   </a:extLst>
                 </a:hlinkClick>
               </a:rPr>
-              <a:t>https://editor.swagger.io/</a:t>
-            </a:r>
-            <a:endParaRPr lang="cs-CZ" dirty="0">
-              <a:solidFill>
-                <a:srgbClr val="FFC000"/>
-              </a:solidFill>
-            </a:endParaRPr>
-          </a:p>
-          <a:p>
-            <a:pPr lvl="1"/>
-            <a:endParaRPr lang="cs-CZ" dirty="0"/>
+              <a:t>https://editor-next.swagger.io/</a:t>
+            </a:r>
+            <a:r>
+              <a:rPr lang="cs-CZ" dirty="0">
+                <a:solidFill>
+                  <a:srgbClr val="FFC000"/>
+                </a:solidFill>
+              </a:rPr>
+              <a:t>  </a:t>
+            </a:r>
           </a:p>
         </p:txBody>
       </p:sp>

</xml_diff>